<commit_message>
change ENG OPER BUTTON to add CAT1/3 selector on ENGINE FUEL Right
</commit_message>
<xml_diff>
--- a/mapping-f16.pptx
+++ b/mapping-f16.pptx
@@ -254,7 +254,7 @@
           <a:p>
             <a:fld id="{730E937F-CA40-4427-8BD6-CB5A6C86C2DF}" type="datetimeFigureOut">
               <a:rPr lang="fr-FR" smtClean="0"/>
-              <a:t>14/05/2020</a:t>
+              <a:t>18/05/2020</a:t>
             </a:fld>
             <a:endParaRPr lang="fr-FR"/>
           </a:p>
@@ -454,7 +454,7 @@
           <a:p>
             <a:fld id="{730E937F-CA40-4427-8BD6-CB5A6C86C2DF}" type="datetimeFigureOut">
               <a:rPr lang="fr-FR" smtClean="0"/>
-              <a:t>14/05/2020</a:t>
+              <a:t>18/05/2020</a:t>
             </a:fld>
             <a:endParaRPr lang="fr-FR"/>
           </a:p>
@@ -634,7 +634,7 @@
           <a:p>
             <a:fld id="{730E937F-CA40-4427-8BD6-CB5A6C86C2DF}" type="datetimeFigureOut">
               <a:rPr lang="fr-FR" smtClean="0"/>
-              <a:t>14/05/2020</a:t>
+              <a:t>18/05/2020</a:t>
             </a:fld>
             <a:endParaRPr lang="fr-FR"/>
           </a:p>
@@ -804,7 +804,7 @@
           <a:p>
             <a:fld id="{730E937F-CA40-4427-8BD6-CB5A6C86C2DF}" type="datetimeFigureOut">
               <a:rPr lang="fr-FR" smtClean="0"/>
-              <a:t>14/05/2020</a:t>
+              <a:t>18/05/2020</a:t>
             </a:fld>
             <a:endParaRPr lang="fr-FR"/>
           </a:p>
@@ -1080,7 +1080,7 @@
           <a:p>
             <a:fld id="{730E937F-CA40-4427-8BD6-CB5A6C86C2DF}" type="datetimeFigureOut">
               <a:rPr lang="fr-FR" smtClean="0"/>
-              <a:t>14/05/2020</a:t>
+              <a:t>18/05/2020</a:t>
             </a:fld>
             <a:endParaRPr lang="fr-FR"/>
           </a:p>
@@ -1312,7 +1312,7 @@
           <a:p>
             <a:fld id="{730E937F-CA40-4427-8BD6-CB5A6C86C2DF}" type="datetimeFigureOut">
               <a:rPr lang="fr-FR" smtClean="0"/>
-              <a:t>14/05/2020</a:t>
+              <a:t>18/05/2020</a:t>
             </a:fld>
             <a:endParaRPr lang="fr-FR"/>
           </a:p>
@@ -1679,7 +1679,7 @@
           <a:p>
             <a:fld id="{730E937F-CA40-4427-8BD6-CB5A6C86C2DF}" type="datetimeFigureOut">
               <a:rPr lang="fr-FR" smtClean="0"/>
-              <a:t>14/05/2020</a:t>
+              <a:t>18/05/2020</a:t>
             </a:fld>
             <a:endParaRPr lang="fr-FR"/>
           </a:p>
@@ -1797,7 +1797,7 @@
           <a:p>
             <a:fld id="{730E937F-CA40-4427-8BD6-CB5A6C86C2DF}" type="datetimeFigureOut">
               <a:rPr lang="fr-FR" smtClean="0"/>
-              <a:t>14/05/2020</a:t>
+              <a:t>18/05/2020</a:t>
             </a:fld>
             <a:endParaRPr lang="fr-FR"/>
           </a:p>
@@ -1892,7 +1892,7 @@
           <a:p>
             <a:fld id="{730E937F-CA40-4427-8BD6-CB5A6C86C2DF}" type="datetimeFigureOut">
               <a:rPr lang="fr-FR" smtClean="0"/>
-              <a:t>14/05/2020</a:t>
+              <a:t>18/05/2020</a:t>
             </a:fld>
             <a:endParaRPr lang="fr-FR"/>
           </a:p>
@@ -2169,7 +2169,7 @@
           <a:p>
             <a:fld id="{730E937F-CA40-4427-8BD6-CB5A6C86C2DF}" type="datetimeFigureOut">
               <a:rPr lang="fr-FR" smtClean="0"/>
-              <a:t>14/05/2020</a:t>
+              <a:t>18/05/2020</a:t>
             </a:fld>
             <a:endParaRPr lang="fr-FR"/>
           </a:p>
@@ -2422,7 +2422,7 @@
           <a:p>
             <a:fld id="{730E937F-CA40-4427-8BD6-CB5A6C86C2DF}" type="datetimeFigureOut">
               <a:rPr lang="fr-FR" smtClean="0"/>
-              <a:t>14/05/2020</a:t>
+              <a:t>18/05/2020</a:t>
             </a:fld>
             <a:endParaRPr lang="fr-FR"/>
           </a:p>
@@ -2635,7 +2635,7 @@
           <a:p>
             <a:fld id="{730E937F-CA40-4427-8BD6-CB5A6C86C2DF}" type="datetimeFigureOut">
               <a:rPr lang="fr-FR" smtClean="0"/>
-              <a:t>14/05/2020</a:t>
+              <a:t>18/05/2020</a:t>
             </a:fld>
             <a:endParaRPr lang="fr-FR"/>
           </a:p>
@@ -3516,7 +3516,7 @@
         </p:nvSpPr>
         <p:spPr>
           <a:xfrm>
-            <a:off x="5085809" y="2125979"/>
+            <a:off x="5457284" y="2125979"/>
             <a:ext cx="331726" cy="107191"/>
           </a:xfrm>
           <a:prstGeom prst="roundRect">
@@ -3567,7 +3567,7 @@
         </p:nvSpPr>
         <p:spPr>
           <a:xfrm>
-            <a:off x="5085809" y="2271194"/>
+            <a:off x="5457284" y="2271194"/>
             <a:ext cx="331726" cy="96581"/>
           </a:xfrm>
           <a:prstGeom prst="roundRect">
@@ -3618,7 +3618,7 @@
         </p:nvSpPr>
         <p:spPr>
           <a:xfrm>
-            <a:off x="5085809" y="1980764"/>
+            <a:off x="5457284" y="1980764"/>
             <a:ext cx="331726" cy="107191"/>
           </a:xfrm>
           <a:prstGeom prst="roundRect">
@@ -3669,7 +3669,7 @@
         </p:nvSpPr>
         <p:spPr>
           <a:xfrm>
-            <a:off x="5090570" y="1623032"/>
+            <a:off x="5462045" y="1623032"/>
             <a:ext cx="331726" cy="107191"/>
           </a:xfrm>
           <a:prstGeom prst="roundRect">
@@ -3720,7 +3720,7 @@
         </p:nvSpPr>
         <p:spPr>
           <a:xfrm>
-            <a:off x="5090570" y="1768247"/>
+            <a:off x="5462045" y="1768247"/>
             <a:ext cx="331726" cy="96581"/>
           </a:xfrm>
           <a:prstGeom prst="roundRect">
@@ -3771,7 +3771,7 @@
         </p:nvSpPr>
         <p:spPr>
           <a:xfrm>
-            <a:off x="5090570" y="1477817"/>
+            <a:off x="5462045" y="1477817"/>
             <a:ext cx="331726" cy="107191"/>
           </a:xfrm>
           <a:prstGeom prst="roundRect">
@@ -4079,7 +4079,7 @@
           <a:p>
             <a:pPr algn="ctr"/>
             <a:r>
-              <a:rPr lang="fr-FR" sz="1000" b="1" smtClean="0">
+              <a:rPr lang="fr-FR" sz="1000" b="1" dirty="0" smtClean="0">
                 <a:ln w="0"/>
                 <a:solidFill>
                   <a:schemeClr val="accent1"/>
@@ -4095,7 +4095,7 @@
               <a:t>Version </a:t>
             </a:r>
             <a:r>
-              <a:rPr lang="fr-FR" sz="1000" b="1" smtClean="0">
+              <a:rPr lang="fr-FR" sz="1000" b="1" dirty="0" smtClean="0">
                 <a:ln w="0"/>
                 <a:solidFill>
                   <a:schemeClr val="accent1"/>
@@ -4108,7 +4108,7 @@
                   </a:outerShdw>
                 </a:effectLst>
               </a:rPr>
-              <a:t>0.3.0-snapshot</a:t>
+              <a:t>0.3.0</a:t>
             </a:r>
             <a:endParaRPr lang="fr-FR" sz="1000" b="1" dirty="0" smtClean="0">
               <a:ln w="0"/>
@@ -8395,8 +8395,8 @@
         </p:nvSpPr>
         <p:spPr>
           <a:xfrm>
-            <a:off x="4603350" y="2126690"/>
-            <a:ext cx="416122" cy="106480"/>
+            <a:off x="4479130" y="2126690"/>
+            <a:ext cx="959106" cy="106480"/>
           </a:xfrm>
           <a:prstGeom prst="roundRect">
             <a:avLst/>
@@ -8423,18 +8423,24 @@
           <a:p>
             <a:pPr algn="ctr"/>
             <a:r>
-              <a:rPr lang="fr-FR" sz="500" b="1" dirty="0" smtClean="0">
-                <a:solidFill>
-                  <a:schemeClr val="tx1"/>
-                </a:solidFill>
-              </a:rPr>
-              <a:t>---</a:t>
-            </a:r>
-            <a:endParaRPr lang="fr-FR" sz="500" b="1" dirty="0">
-              <a:solidFill>
-                <a:srgbClr val="FF0000"/>
-              </a:solidFill>
-            </a:endParaRPr>
+              <a:rPr lang="fr-FR" sz="400" b="1" dirty="0">
+                <a:solidFill>
+                  <a:schemeClr val="tx1"/>
+                </a:solidFill>
+              </a:rPr>
+              <a:t>HDPT-FCR-RDRALT</a:t>
+            </a:r>
+          </a:p>
+          <a:p>
+            <a:pPr algn="ctr"/>
+            <a:r>
+              <a:rPr lang="fr-FR" sz="400" b="1" dirty="0">
+                <a:solidFill>
+                  <a:schemeClr val="tx1"/>
+                </a:solidFill>
+              </a:rPr>
+              <a:t>ON</a:t>
+            </a:r>
           </a:p>
         </p:txBody>
       </p:sp>
@@ -8446,8 +8452,8 @@
         </p:nvSpPr>
         <p:spPr>
           <a:xfrm>
-            <a:off x="4603350" y="2272800"/>
-            <a:ext cx="416122" cy="106480"/>
+            <a:off x="4479130" y="2272800"/>
+            <a:ext cx="959106" cy="106480"/>
           </a:xfrm>
           <a:prstGeom prst="roundRect">
             <a:avLst/>
@@ -8474,16 +8480,27 @@
           <a:p>
             <a:pPr algn="ctr"/>
             <a:r>
-              <a:rPr lang="fr-FR" sz="500" b="1" dirty="0" smtClean="0">
-                <a:solidFill>
-                  <a:schemeClr val="tx1"/>
-                </a:solidFill>
-              </a:rPr>
-              <a:t>---</a:t>
-            </a:r>
-            <a:endParaRPr lang="fr-FR" sz="500" b="1" dirty="0">
+              <a:rPr lang="fr-FR" sz="400" b="1" dirty="0">
+                <a:solidFill>
+                  <a:schemeClr val="tx1"/>
+                </a:solidFill>
+              </a:rPr>
+              <a:t>HDPT-FCR-RDRALT</a:t>
+            </a:r>
+          </a:p>
+          <a:p>
+            <a:pPr algn="ctr"/>
+            <a:r>
+              <a:rPr lang="fr-FR" sz="400" b="1" dirty="0">
+                <a:solidFill>
+                  <a:schemeClr val="tx1"/>
+                </a:solidFill>
+              </a:rPr>
+              <a:t>OFF</a:t>
+            </a:r>
+            <a:endParaRPr lang="fr-FR" sz="400" b="1" dirty="0">
               <a:solidFill>
-                <a:srgbClr val="FF0000"/>
+                <a:schemeClr val="tx1"/>
               </a:solidFill>
             </a:endParaRPr>
           </a:p>
@@ -8497,8 +8514,8 @@
         </p:nvSpPr>
         <p:spPr>
           <a:xfrm>
-            <a:off x="4601775" y="1626602"/>
-            <a:ext cx="416122" cy="106480"/>
+            <a:off x="4479130" y="1626602"/>
+            <a:ext cx="959106" cy="106480"/>
           </a:xfrm>
           <a:prstGeom prst="roundRect">
             <a:avLst/>
@@ -8525,18 +8542,24 @@
           <a:p>
             <a:pPr algn="ctr"/>
             <a:r>
-              <a:rPr lang="fr-FR" sz="500" b="1" dirty="0" smtClean="0">
-                <a:solidFill>
-                  <a:schemeClr val="tx1"/>
-                </a:solidFill>
-              </a:rPr>
-              <a:t>---</a:t>
-            </a:r>
-            <a:endParaRPr lang="fr-FR" sz="500" b="1" dirty="0">
-              <a:solidFill>
-                <a:srgbClr val="FF0000"/>
-              </a:solidFill>
-            </a:endParaRPr>
+              <a:rPr lang="fr-FR" sz="400" b="1" dirty="0">
+                <a:solidFill>
+                  <a:schemeClr val="tx1"/>
+                </a:solidFill>
+              </a:rPr>
+              <a:t>MMC-STSTA-MFD-UFC-GPS-DL-MIDS</a:t>
+            </a:r>
+          </a:p>
+          <a:p>
+            <a:pPr algn="ctr"/>
+            <a:r>
+              <a:rPr lang="fr-FR" sz="400" b="1" dirty="0">
+                <a:solidFill>
+                  <a:schemeClr val="tx1"/>
+                </a:solidFill>
+              </a:rPr>
+              <a:t>ON</a:t>
+            </a:r>
           </a:p>
         </p:txBody>
       </p:sp>
@@ -8548,8 +8571,8 @@
         </p:nvSpPr>
         <p:spPr>
           <a:xfrm>
-            <a:off x="4601775" y="1772712"/>
-            <a:ext cx="416122" cy="106480"/>
+            <a:off x="4479130" y="1772712"/>
+            <a:ext cx="959106" cy="106480"/>
           </a:xfrm>
           <a:prstGeom prst="roundRect">
             <a:avLst/>
@@ -8576,16 +8599,27 @@
           <a:p>
             <a:pPr algn="ctr"/>
             <a:r>
-              <a:rPr lang="fr-FR" sz="500" b="1" dirty="0" smtClean="0">
-                <a:solidFill>
-                  <a:schemeClr val="tx1"/>
-                </a:solidFill>
-              </a:rPr>
-              <a:t>---</a:t>
-            </a:r>
-            <a:endParaRPr lang="fr-FR" sz="500" b="1" dirty="0">
+              <a:rPr lang="fr-FR" sz="400" b="1" dirty="0">
+                <a:solidFill>
+                  <a:schemeClr val="tx1"/>
+                </a:solidFill>
+              </a:rPr>
+              <a:t>MMC-STSTA-MFD-UFC-GPS-DL-MIDS</a:t>
+            </a:r>
+          </a:p>
+          <a:p>
+            <a:pPr algn="ctr"/>
+            <a:r>
+              <a:rPr lang="fr-FR" sz="400" b="1" dirty="0">
+                <a:solidFill>
+                  <a:schemeClr val="tx1"/>
+                </a:solidFill>
+              </a:rPr>
+              <a:t>OFF</a:t>
+            </a:r>
+            <a:endParaRPr lang="fr-FR" sz="400" b="1" dirty="0">
               <a:solidFill>
-                <a:srgbClr val="FF0000"/>
+                <a:schemeClr val="tx1"/>
               </a:solidFill>
             </a:endParaRPr>
           </a:p>
@@ -8599,8 +8633,8 @@
         </p:nvSpPr>
         <p:spPr>
           <a:xfrm>
-            <a:off x="4610358" y="1474862"/>
-            <a:ext cx="416122" cy="106480"/>
+            <a:off x="4479130" y="1474862"/>
+            <a:ext cx="959105" cy="106480"/>
           </a:xfrm>
           <a:prstGeom prst="roundRect">
             <a:avLst/>
@@ -8627,14 +8661,14 @@
           <a:p>
             <a:pPr algn="ctr"/>
             <a:r>
-              <a:rPr lang="fr-FR" sz="500" b="1" dirty="0" smtClean="0">
+              <a:rPr lang="fr-FR" sz="400" b="1" dirty="0" smtClean="0">
                 <a:solidFill>
                   <a:schemeClr val="tx1"/>
                 </a:solidFill>
               </a:rPr>
               <a:t>A/G Mode</a:t>
             </a:r>
-            <a:endParaRPr lang="fr-FR" sz="500" b="1" dirty="0">
+            <a:endParaRPr lang="fr-FR" sz="400" b="1" dirty="0">
               <a:solidFill>
                 <a:srgbClr val="FF0000"/>
               </a:solidFill>
@@ -8650,8 +8684,8 @@
         </p:nvSpPr>
         <p:spPr>
           <a:xfrm>
-            <a:off x="4601775" y="1979683"/>
-            <a:ext cx="416122" cy="106480"/>
+            <a:off x="4479130" y="1979683"/>
+            <a:ext cx="959106" cy="106480"/>
           </a:xfrm>
           <a:prstGeom prst="roundRect">
             <a:avLst/>
@@ -8678,14 +8712,14 @@
           <a:p>
             <a:pPr algn="ctr"/>
             <a:r>
-              <a:rPr lang="fr-FR" sz="500" b="1" dirty="0" smtClean="0">
+              <a:rPr lang="fr-FR" sz="400" b="1" dirty="0" smtClean="0">
                 <a:solidFill>
                   <a:schemeClr val="tx1"/>
                 </a:solidFill>
               </a:rPr>
               <a:t>A/A Mode</a:t>
             </a:r>
-            <a:endParaRPr lang="fr-FR" sz="500" b="1" dirty="0">
+            <a:endParaRPr lang="fr-FR" sz="400" b="1" dirty="0">
               <a:solidFill>
                 <a:srgbClr val="FF0000"/>
               </a:solidFill>
@@ -8743,19 +8777,13 @@
                   <a:schemeClr val="tx1"/>
                 </a:solidFill>
               </a:rPr>
-              <a:t>HDPT-FCR-RDRALT</a:t>
-            </a:r>
-          </a:p>
-          <a:p>
-            <a:pPr algn="ctr"/>
-            <a:r>
-              <a:rPr lang="fr-FR" sz="500" b="1" dirty="0" smtClean="0">
-                <a:solidFill>
-                  <a:schemeClr val="tx1"/>
-                </a:solidFill>
-              </a:rPr>
-              <a:t>ON</a:t>
-            </a:r>
+              <a:t>CAT 1</a:t>
+            </a:r>
+            <a:endParaRPr lang="fr-FR" sz="500" b="1" dirty="0" smtClean="0">
+              <a:solidFill>
+                <a:schemeClr val="tx1"/>
+              </a:solidFill>
+            </a:endParaRPr>
           </a:p>
         </p:txBody>
       </p:sp>
@@ -8804,12 +8832,12 @@
           <a:p>
             <a:pPr algn="ctr"/>
             <a:r>
-              <a:rPr lang="fr-FR" sz="500" b="1" dirty="0" smtClean="0">
-                <a:solidFill>
-                  <a:schemeClr val="tx1"/>
-                </a:solidFill>
-              </a:rPr>
-              <a:t>HDPT-FCR-RDRALT</a:t>
+              <a:rPr lang="fr-FR" sz="500" b="1" smtClean="0">
+                <a:solidFill>
+                  <a:schemeClr val="tx1"/>
+                </a:solidFill>
+              </a:rPr>
+              <a:t>CAT 3</a:t>
             </a:r>
             <a:endParaRPr lang="fr-FR" sz="500" b="1" dirty="0">
               <a:solidFill>
@@ -8817,22 +8845,6 @@
               </a:solidFill>
             </a:endParaRPr>
           </a:p>
-          <a:p>
-            <a:pPr algn="ctr"/>
-            <a:r>
-              <a:rPr lang="fr-FR" sz="500" b="1" dirty="0" smtClean="0">
-                <a:solidFill>
-                  <a:schemeClr val="tx1"/>
-                </a:solidFill>
-              </a:rPr>
-              <a:t>OFF</a:t>
-            </a:r>
-            <a:endParaRPr lang="fr-FR" sz="500" b="1" dirty="0">
-              <a:solidFill>
-                <a:schemeClr val="tx1"/>
-              </a:solidFill>
-            </a:endParaRPr>
-          </a:p>
         </p:txBody>
       </p:sp>
       <p:sp>
@@ -8843,8 +8855,8 @@
         </p:nvSpPr>
         <p:spPr>
           <a:xfrm>
-            <a:off x="1935164" y="713047"/>
-            <a:ext cx="1024729" cy="152400"/>
+            <a:off x="2393635" y="713047"/>
+            <a:ext cx="566258" cy="152400"/>
           </a:xfrm>
           <a:prstGeom prst="roundRect">
             <a:avLst/>
@@ -8885,27 +8897,13 @@
                   <a:schemeClr val="tx1"/>
                 </a:solidFill>
               </a:rPr>
-              <a:t>MMC-STSTA-MFD-UFC-GPS-DL-MIDS</a:t>
-            </a:r>
-          </a:p>
-          <a:p>
-            <a:pPr algn="ctr"/>
-            <a:r>
-              <a:rPr lang="fr-FR" sz="500" b="1" dirty="0">
-                <a:solidFill>
-                  <a:schemeClr val="tx1"/>
-                </a:solidFill>
-              </a:rPr>
-              <a:t>O</a:t>
-            </a:r>
-            <a:r>
-              <a:rPr lang="fr-FR" sz="500" b="1" dirty="0" smtClean="0">
-                <a:solidFill>
-                  <a:schemeClr val="tx1"/>
-                </a:solidFill>
-              </a:rPr>
-              <a:t>N</a:t>
-            </a:r>
+              <a:t>---</a:t>
+            </a:r>
+            <a:endParaRPr lang="fr-FR" sz="500" b="1" dirty="0" smtClean="0">
+              <a:solidFill>
+                <a:schemeClr val="tx1"/>
+              </a:solidFill>
+            </a:endParaRPr>
           </a:p>
         </p:txBody>
       </p:sp>
@@ -8917,8 +8915,8 @@
         </p:nvSpPr>
         <p:spPr>
           <a:xfrm>
-            <a:off x="1935164" y="915258"/>
-            <a:ext cx="1024729" cy="152400"/>
+            <a:off x="2393635" y="915258"/>
+            <a:ext cx="561168" cy="152400"/>
           </a:xfrm>
           <a:prstGeom prst="roundRect">
             <a:avLst/>
@@ -8954,23 +8952,12 @@
           <a:p>
             <a:pPr algn="ctr"/>
             <a:r>
-              <a:rPr lang="fr-FR" sz="500" b="1" dirty="0">
-                <a:solidFill>
-                  <a:schemeClr val="tx1"/>
-                </a:solidFill>
-              </a:rPr>
-              <a:t>MMC-STSTA-MFD-UFC-GPS-DL-MIDS</a:t>
-            </a:r>
-          </a:p>
-          <a:p>
-            <a:pPr algn="ctr"/>
-            <a:r>
-              <a:rPr lang="fr-FR" sz="500" b="1" dirty="0" smtClean="0">
-                <a:solidFill>
-                  <a:schemeClr val="tx1"/>
-                </a:solidFill>
-              </a:rPr>
-              <a:t>OFF</a:t>
+              <a:rPr lang="fr-FR" sz="500" b="1" dirty="0" smtClean="0">
+                <a:solidFill>
+                  <a:schemeClr val="tx1"/>
+                </a:solidFill>
+              </a:rPr>
+              <a:t>---</a:t>
             </a:r>
             <a:endParaRPr lang="fr-FR" sz="500" b="1" dirty="0">
               <a:solidFill>
@@ -9662,21 +9649,6 @@
 </file>
 
 <file path=customXml/item1.xml><?xml version="1.0" encoding="utf-8"?>
-<p:properties xmlns:p="http://schemas.microsoft.com/office/2006/metadata/properties" xmlns:xsi="http://www.w3.org/2001/XMLSchema-instance" xmlns:pc="http://schemas.microsoft.com/office/infopath/2007/PartnerControls">
-  <documentManagement/>
-</p:properties>
-</file>
-
-<file path=customXml/item2.xml><?xml version="1.0" encoding="utf-8"?>
-<?mso-contentType ?>
-<FormTemplates xmlns="http://schemas.microsoft.com/sharepoint/v3/contenttype/forms">
-  <Display>DocumentLibraryForm</Display>
-  <Edit>DocumentLibraryForm</Edit>
-  <New>DocumentLibraryForm</New>
-</FormTemplates>
-</file>
-
-<file path=customXml/item3.xml><?xml version="1.0" encoding="utf-8"?>
 <ct:contentTypeSchema xmlns:ct="http://schemas.microsoft.com/office/2006/metadata/contentType" xmlns:ma="http://schemas.microsoft.com/office/2006/metadata/properties/metaAttributes" ct:_="" ma:_="" ma:contentTypeName="Document" ma:contentTypeID="0x010100CA3BA519E3143F46AB8865AAE99E1BB1" ma:contentTypeVersion="11" ma:contentTypeDescription="Crée un document." ma:contentTypeScope="" ma:versionID="2f2998795989e536505ccea9b836f258">
   <xsd:schema xmlns:xsd="http://www.w3.org/2001/XMLSchema" xmlns:xs="http://www.w3.org/2001/XMLSchema" xmlns:p="http://schemas.microsoft.com/office/2006/metadata/properties" xmlns:ns3="772924e2-c6aa-46a4-8697-4f5231dbe16b" xmlns:ns4="570994ca-78c5-4253-8637-6791641f6401" targetNamespace="http://schemas.microsoft.com/office/2006/metadata/properties" ma:root="true" ma:fieldsID="91314586046bd90ec4b408b110282d15" ns3:_="" ns4:_="">
     <xsd:import namespace="772924e2-c6aa-46a4-8697-4f5231dbe16b"/>
@@ -9885,32 +9857,22 @@
 </ct:contentTypeSchema>
 </file>
 
-<file path=customXml/itemProps1.xml><?xml version="1.0" encoding="utf-8"?>
-<ds:datastoreItem xmlns:ds="http://schemas.openxmlformats.org/officeDocument/2006/customXml" ds:itemID="{9D127F6C-923B-4559-9B6F-C7096123A1A8}">
-  <ds:schemaRefs>
-    <ds:schemaRef ds:uri="570994ca-78c5-4253-8637-6791641f6401"/>
-    <ds:schemaRef ds:uri="http://purl.org/dc/dcmitype/"/>
-    <ds:schemaRef ds:uri="http://schemas.microsoft.com/office/infopath/2007/PartnerControls"/>
-    <ds:schemaRef ds:uri="772924e2-c6aa-46a4-8697-4f5231dbe16b"/>
-    <ds:schemaRef ds:uri="http://purl.org/dc/elements/1.1/"/>
-    <ds:schemaRef ds:uri="http://schemas.microsoft.com/office/2006/metadata/properties"/>
-    <ds:schemaRef ds:uri="http://schemas.microsoft.com/office/2006/documentManagement/types"/>
-    <ds:schemaRef ds:uri="http://purl.org/dc/terms/"/>
-    <ds:schemaRef ds:uri="http://schemas.openxmlformats.org/package/2006/metadata/core-properties"/>
-    <ds:schemaRef ds:uri="http://www.w3.org/XML/1998/namespace"/>
-  </ds:schemaRefs>
-</ds:datastoreItem>
+<file path=customXml/item2.xml><?xml version="1.0" encoding="utf-8"?>
+<?mso-contentType ?>
+<FormTemplates xmlns="http://schemas.microsoft.com/sharepoint/v3/contenttype/forms">
+  <Display>DocumentLibraryForm</Display>
+  <Edit>DocumentLibraryForm</Edit>
+  <New>DocumentLibraryForm</New>
+</FormTemplates>
 </file>
 
-<file path=customXml/itemProps2.xml><?xml version="1.0" encoding="utf-8"?>
-<ds:datastoreItem xmlns:ds="http://schemas.openxmlformats.org/officeDocument/2006/customXml" ds:itemID="{6C13C132-94FE-46E5-9EC9-B0647DE63F4B}">
-  <ds:schemaRefs>
-    <ds:schemaRef ds:uri="http://schemas.microsoft.com/sharepoint/v3/contenttype/forms"/>
-  </ds:schemaRefs>
-</ds:datastoreItem>
+<file path=customXml/item3.xml><?xml version="1.0" encoding="utf-8"?>
+<p:properties xmlns:p="http://schemas.microsoft.com/office/2006/metadata/properties" xmlns:xsi="http://www.w3.org/2001/XMLSchema-instance" xmlns:pc="http://schemas.microsoft.com/office/infopath/2007/PartnerControls">
+  <documentManagement/>
+</p:properties>
 </file>
 
-<file path=customXml/itemProps3.xml><?xml version="1.0" encoding="utf-8"?>
+<file path=customXml/itemProps1.xml><?xml version="1.0" encoding="utf-8"?>
 <ds:datastoreItem xmlns:ds="http://schemas.openxmlformats.org/officeDocument/2006/customXml" ds:itemID="{95BECF06-B889-4194-BBE4-A70F6465029E}">
   <ds:schemaRefs>
     <ds:schemaRef ds:uri="http://schemas.microsoft.com/office/2006/metadata/contentType"/>
@@ -9927,4 +9889,29 @@
     <ds:schemaRef ds:uri="http://schemas.microsoft.com/internal/obd"/>
   </ds:schemaRefs>
 </ds:datastoreItem>
+</file>
+
+<file path=customXml/itemProps2.xml><?xml version="1.0" encoding="utf-8"?>
+<ds:datastoreItem xmlns:ds="http://schemas.openxmlformats.org/officeDocument/2006/customXml" ds:itemID="{6C13C132-94FE-46E5-9EC9-B0647DE63F4B}">
+  <ds:schemaRefs>
+    <ds:schemaRef ds:uri="http://schemas.microsoft.com/sharepoint/v3/contenttype/forms"/>
+  </ds:schemaRefs>
+</ds:datastoreItem>
+</file>
+
+<file path=customXml/itemProps3.xml><?xml version="1.0" encoding="utf-8"?>
+<ds:datastoreItem xmlns:ds="http://schemas.openxmlformats.org/officeDocument/2006/customXml" ds:itemID="{9D127F6C-923B-4559-9B6F-C7096123A1A8}">
+  <ds:schemaRefs>
+    <ds:schemaRef ds:uri="http://schemas.microsoft.com/office/infopath/2007/PartnerControls"/>
+    <ds:schemaRef ds:uri="http://schemas.microsoft.com/office/2006/documentManagement/types"/>
+    <ds:schemaRef ds:uri="http://purl.org/dc/elements/1.1/"/>
+    <ds:schemaRef ds:uri="http://schemas.microsoft.com/office/2006/metadata/properties"/>
+    <ds:schemaRef ds:uri="http://purl.org/dc/terms/"/>
+    <ds:schemaRef ds:uri="http://schemas.openxmlformats.org/package/2006/metadata/core-properties"/>
+    <ds:schemaRef ds:uri="570994ca-78c5-4253-8637-6791641f6401"/>
+    <ds:schemaRef ds:uri="http://purl.org/dc/dcmitype/"/>
+    <ds:schemaRef ds:uri="772924e2-c6aa-46a4-8697-4f5231dbe16b"/>
+    <ds:schemaRef ds:uri="http://www.w3.org/XML/1998/namespace"/>
+  </ds:schemaRefs>
+</ds:datastoreItem>
 </file>
</xml_diff>